<commit_message>
edits part 2 011322
</commit_message>
<xml_diff>
--- a/docs/images/jfrog-architecture-diagram.pptx
+++ b/docs/images/jfrog-architecture-diagram.pptx
@@ -200,7 +200,7 @@
           <a:p>
             <a:fld id="{590E2399-5717-194F-AD3A-E8B320BF82AF}" type="datetimeFigureOut">
               <a:rPr lang="en-US" smtClean="0"/>
-              <a:t>11/24/21</a:t>
+              <a:t>1/12/2022</a:t>
             </a:fld>
             <a:endParaRPr lang="en-US"/>
           </a:p>
@@ -952,7 +952,7 @@
           <a:p>
             <a:fld id="{F55C447A-44A3-5F49-B3D4-7D25A8EEBE0E}" type="datetimeFigureOut">
               <a:rPr lang="en-US" smtClean="0"/>
-              <a:t>11/24/21</a:t>
+              <a:t>1/12/2022</a:t>
             </a:fld>
             <a:endParaRPr lang="en-US"/>
           </a:p>
@@ -1122,7 +1122,7 @@
           <a:p>
             <a:fld id="{F55C447A-44A3-5F49-B3D4-7D25A8EEBE0E}" type="datetimeFigureOut">
               <a:rPr lang="en-US" smtClean="0"/>
-              <a:t>11/24/21</a:t>
+              <a:t>1/12/2022</a:t>
             </a:fld>
             <a:endParaRPr lang="en-US"/>
           </a:p>
@@ -1302,7 +1302,7 @@
           <a:p>
             <a:fld id="{F55C447A-44A3-5F49-B3D4-7D25A8EEBE0E}" type="datetimeFigureOut">
               <a:rPr lang="en-US" smtClean="0"/>
-              <a:t>11/24/21</a:t>
+              <a:t>1/12/2022</a:t>
             </a:fld>
             <a:endParaRPr lang="en-US"/>
           </a:p>
@@ -1686,7 +1686,7 @@
           <a:p>
             <a:fld id="{F55C447A-44A3-5F49-B3D4-7D25A8EEBE0E}" type="datetimeFigureOut">
               <a:rPr lang="en-US" smtClean="0"/>
-              <a:t>11/24/21</a:t>
+              <a:t>1/12/2022</a:t>
             </a:fld>
             <a:endParaRPr lang="en-US"/>
           </a:p>
@@ -1930,7 +1930,7 @@
           <a:p>
             <a:fld id="{F55C447A-44A3-5F49-B3D4-7D25A8EEBE0E}" type="datetimeFigureOut">
               <a:rPr lang="en-US" smtClean="0"/>
-              <a:t>11/24/21</a:t>
+              <a:t>1/12/2022</a:t>
             </a:fld>
             <a:endParaRPr lang="en-US"/>
           </a:p>
@@ -2162,7 +2162,7 @@
           <a:p>
             <a:fld id="{F55C447A-44A3-5F49-B3D4-7D25A8EEBE0E}" type="datetimeFigureOut">
               <a:rPr lang="en-US" smtClean="0"/>
-              <a:t>11/24/21</a:t>
+              <a:t>1/12/2022</a:t>
             </a:fld>
             <a:endParaRPr lang="en-US"/>
           </a:p>
@@ -2529,7 +2529,7 @@
           <a:p>
             <a:fld id="{F55C447A-44A3-5F49-B3D4-7D25A8EEBE0E}" type="datetimeFigureOut">
               <a:rPr lang="en-US" smtClean="0"/>
-              <a:t>11/24/21</a:t>
+              <a:t>1/12/2022</a:t>
             </a:fld>
             <a:endParaRPr lang="en-US"/>
           </a:p>
@@ -2647,7 +2647,7 @@
           <a:p>
             <a:fld id="{F55C447A-44A3-5F49-B3D4-7D25A8EEBE0E}" type="datetimeFigureOut">
               <a:rPr lang="en-US" smtClean="0"/>
-              <a:t>11/24/21</a:t>
+              <a:t>1/12/2022</a:t>
             </a:fld>
             <a:endParaRPr lang="en-US"/>
           </a:p>
@@ -2742,7 +2742,7 @@
           <a:p>
             <a:fld id="{F55C447A-44A3-5F49-B3D4-7D25A8EEBE0E}" type="datetimeFigureOut">
               <a:rPr lang="en-US" smtClean="0"/>
-              <a:t>11/24/21</a:t>
+              <a:t>1/12/2022</a:t>
             </a:fld>
             <a:endParaRPr lang="en-US"/>
           </a:p>
@@ -3019,7 +3019,7 @@
           <a:p>
             <a:fld id="{F55C447A-44A3-5F49-B3D4-7D25A8EEBE0E}" type="datetimeFigureOut">
               <a:rPr lang="en-US" smtClean="0"/>
-              <a:t>11/24/21</a:t>
+              <a:t>1/12/2022</a:t>
             </a:fld>
             <a:endParaRPr lang="en-US"/>
           </a:p>
@@ -3276,7 +3276,7 @@
           <a:p>
             <a:fld id="{F55C447A-44A3-5F49-B3D4-7D25A8EEBE0E}" type="datetimeFigureOut">
               <a:rPr lang="en-US" smtClean="0"/>
-              <a:t>11/24/21</a:t>
+              <a:t>1/12/2022</a:t>
             </a:fld>
             <a:endParaRPr lang="en-US"/>
           </a:p>
@@ -3489,7 +3489,7 @@
           <a:p>
             <a:fld id="{F55C447A-44A3-5F49-B3D4-7D25A8EEBE0E}" type="datetimeFigureOut">
               <a:rPr lang="en-US" smtClean="0"/>
-              <a:t>11/24/21</a:t>
+              <a:t>1/12/2022</a:t>
             </a:fld>
             <a:endParaRPr lang="en-US"/>
           </a:p>

</xml_diff>